<commit_message>
added a screenshot of sm vars
</commit_message>
<xml_diff>
--- a/documents/schematic.pptx
+++ b/documents/schematic.pptx
@@ -202,7 +202,7 @@
           <a:p>
             <a:fld id="{BB23DA76-490A-9141-B0CD-EB2032D5A250}" type="datetimeFigureOut">
               <a:rPr lang="en-CN" smtClean="0"/>
-              <a:t>2023/3/22</a:t>
+              <a:t>2023/3/24</a:t>
             </a:fld>
             <a:endParaRPr lang="en-CN"/>
           </a:p>
@@ -703,7 +703,7 @@
           <a:p>
             <a:fld id="{237800A5-CE79-974E-9ED3-B2FD2A3CC5A1}" type="datetime1">
               <a:rPr lang="en-US" smtClean="0"/>
-              <a:t>3/22/23</a:t>
+              <a:t>3/24/23</a:t>
             </a:fld>
             <a:endParaRPr lang="en-CN"/>
           </a:p>
@@ -903,7 +903,7 @@
           <a:p>
             <a:fld id="{2A6C3F31-B48E-4F44-8274-DB9A1A4225DC}" type="datetime1">
               <a:rPr lang="en-US" smtClean="0"/>
-              <a:t>3/22/23</a:t>
+              <a:t>3/24/23</a:t>
             </a:fld>
             <a:endParaRPr lang="en-CN"/>
           </a:p>
@@ -1113,7 +1113,7 @@
           <a:p>
             <a:fld id="{0802E446-0BAA-D045-ADEE-B00B6042D9B4}" type="datetime1">
               <a:rPr lang="en-US" smtClean="0"/>
-              <a:t>3/22/23</a:t>
+              <a:t>3/24/23</a:t>
             </a:fld>
             <a:endParaRPr lang="en-CN"/>
           </a:p>
@@ -1313,7 +1313,7 @@
           <a:p>
             <a:fld id="{22D42548-4204-D64A-ADFB-0D516A221358}" type="datetime1">
               <a:rPr lang="en-US" smtClean="0"/>
-              <a:t>3/22/23</a:t>
+              <a:t>3/24/23</a:t>
             </a:fld>
             <a:endParaRPr lang="en-CN"/>
           </a:p>
@@ -1589,7 +1589,7 @@
           <a:p>
             <a:fld id="{F4ECA773-94A3-5D47-B6E9-DCCA21966B63}" type="datetime1">
               <a:rPr lang="en-US" smtClean="0"/>
-              <a:t>3/22/23</a:t>
+              <a:t>3/24/23</a:t>
             </a:fld>
             <a:endParaRPr lang="en-CN"/>
           </a:p>
@@ -1857,7 +1857,7 @@
           <a:p>
             <a:fld id="{FC4891AE-1237-0C4E-B6D9-039680F10030}" type="datetime1">
               <a:rPr lang="en-US" smtClean="0"/>
-              <a:t>3/22/23</a:t>
+              <a:t>3/24/23</a:t>
             </a:fld>
             <a:endParaRPr lang="en-CN"/>
           </a:p>
@@ -2272,7 +2272,7 @@
           <a:p>
             <a:fld id="{5E827703-6922-114C-9D73-D7C2C048FF34}" type="datetime1">
               <a:rPr lang="en-US" smtClean="0"/>
-              <a:t>3/22/23</a:t>
+              <a:t>3/24/23</a:t>
             </a:fld>
             <a:endParaRPr lang="en-CN"/>
           </a:p>
@@ -2414,7 +2414,7 @@
           <a:p>
             <a:fld id="{36A19DAB-F4CD-CF45-8747-F4752CF88983}" type="datetime1">
               <a:rPr lang="en-US" smtClean="0"/>
-              <a:t>3/22/23</a:t>
+              <a:t>3/24/23</a:t>
             </a:fld>
             <a:endParaRPr lang="en-CN"/>
           </a:p>
@@ -2527,7 +2527,7 @@
           <a:p>
             <a:fld id="{37FBC488-431C-E948-90EF-1C1050F04F95}" type="datetime1">
               <a:rPr lang="en-US" smtClean="0"/>
-              <a:t>3/22/23</a:t>
+              <a:t>3/24/23</a:t>
             </a:fld>
             <a:endParaRPr lang="en-CN"/>
           </a:p>
@@ -2840,7 +2840,7 @@
           <a:p>
             <a:fld id="{37CD32BE-6A09-0041-900E-4E0126E58FBF}" type="datetime1">
               <a:rPr lang="en-US" smtClean="0"/>
-              <a:t>3/22/23</a:t>
+              <a:t>3/24/23</a:t>
             </a:fld>
             <a:endParaRPr lang="en-CN"/>
           </a:p>
@@ -3129,7 +3129,7 @@
           <a:p>
             <a:fld id="{983B47F7-5CA7-DB48-BBA8-19111815F8A4}" type="datetime1">
               <a:rPr lang="en-US" smtClean="0"/>
-              <a:t>3/22/23</a:t>
+              <a:t>3/24/23</a:t>
             </a:fld>
             <a:endParaRPr lang="en-CN"/>
           </a:p>
@@ -3372,7 +3372,7 @@
           <a:p>
             <a:fld id="{F228EDDE-C7B5-1B43-82CE-4BC06C16AC9A}" type="datetime1">
               <a:rPr lang="en-US" smtClean="0"/>
-              <a:t>3/22/23</a:t>
+              <a:t>3/24/23</a:t>
             </a:fld>
             <a:endParaRPr lang="en-CN"/>
           </a:p>
@@ -16566,7 +16566,7 @@
         <p:spPr>
           <a:xfrm>
             <a:off x="164179" y="584009"/>
-            <a:ext cx="11431473" cy="2200602"/>
+            <a:ext cx="11431473" cy="3077766"/>
           </a:xfrm>
           <a:prstGeom prst="rect">
             <a:avLst/>
@@ -16624,7 +16624,7 @@
                 <a:latin typeface="Poppins" pitchFamily="2" charset="77"/>
                 <a:cs typeface="Poppins" pitchFamily="2" charset="77"/>
               </a:rPr>
-              <a:t>There are many var associated with soil moisture in </a:t>
+              <a:t>There are multiple vars associated with soil moisture in </a:t>
             </a:r>
             <a:r>
               <a:rPr lang="en-US" sz="1400" b="1" dirty="0" err="1">
@@ -16667,6 +16667,42 @@
               </a:spcAft>
               <a:buAutoNum type="arabicPeriod"/>
             </a:pPr>
+            <a:endParaRPr lang="en-US" sz="1400" dirty="0">
+              <a:latin typeface="Poppins" pitchFamily="2" charset="77"/>
+              <a:cs typeface="Poppins" pitchFamily="2" charset="77"/>
+            </a:endParaRPr>
+          </a:p>
+          <a:p>
+            <a:pPr marL="342900" indent="-342900">
+              <a:spcAft>
+                <a:spcPts val="600"/>
+              </a:spcAft>
+              <a:buAutoNum type="arabicPeriod"/>
+            </a:pPr>
+            <a:endParaRPr lang="en-US" sz="1400" dirty="0">
+              <a:latin typeface="Poppins" pitchFamily="2" charset="77"/>
+              <a:cs typeface="Poppins" pitchFamily="2" charset="77"/>
+            </a:endParaRPr>
+          </a:p>
+          <a:p>
+            <a:pPr marL="342900" indent="-342900">
+              <a:spcAft>
+                <a:spcPts val="600"/>
+              </a:spcAft>
+              <a:buAutoNum type="arabicPeriod"/>
+            </a:pPr>
+            <a:endParaRPr lang="en-US" sz="1400" dirty="0">
+              <a:latin typeface="Poppins" pitchFamily="2" charset="77"/>
+              <a:cs typeface="Poppins" pitchFamily="2" charset="77"/>
+            </a:endParaRPr>
+          </a:p>
+          <a:p>
+            <a:pPr marL="342900" indent="-342900">
+              <a:spcAft>
+                <a:spcPts val="600"/>
+              </a:spcAft>
+              <a:buAutoNum type="arabicPeriod"/>
+            </a:pPr>
             <a:r>
               <a:rPr lang="en-US" sz="1400" b="1" dirty="0">
                 <a:latin typeface="Poppins" pitchFamily="2" charset="77"/>
@@ -16695,6 +16731,36 @@
           </a:p>
         </p:txBody>
       </p:sp>
+      <p:pic>
+        <p:nvPicPr>
+          <p:cNvPr id="3" name="Picture 2">
+            <a:extLst>
+              <a:ext uri="{FF2B5EF4-FFF2-40B4-BE49-F238E27FC236}">
+                <a16:creationId xmlns:a16="http://schemas.microsoft.com/office/drawing/2014/main" id="{6EBD3F72-F037-CFB8-F6FE-E6AB22EDF86D}"/>
+              </a:ext>
+            </a:extLst>
+          </p:cNvPr>
+          <p:cNvPicPr>
+            <a:picLocks noChangeAspect="1"/>
+          </p:cNvPicPr>
+          <p:nvPr/>
+        </p:nvPicPr>
+        <p:blipFill>
+          <a:blip r:embed="rId2"/>
+          <a:stretch>
+            <a:fillRect/>
+          </a:stretch>
+        </p:blipFill>
+        <p:spPr>
+          <a:xfrm>
+            <a:off x="596348" y="1934063"/>
+            <a:ext cx="7404100" cy="546100"/>
+          </a:xfrm>
+          <a:prstGeom prst="rect">
+            <a:avLst/>
+          </a:prstGeom>
+        </p:spPr>
+      </p:pic>
     </p:spTree>
     <p:extLst>
       <p:ext uri="{BB962C8B-B14F-4D97-AF65-F5344CB8AC3E}">

</xml_diff>